<commit_message>
Fix title of some slides
</commit_message>
<xml_diff>
--- a/JPP6-JCR/Day-5.pptx
+++ b/JPP6-JCR/Day-5.pptx
@@ -7500,16 +7500,15 @@
               </a:lnSpc>
             </a:pPr>
             <a:r>
-              <a:rPr lang="en-GB" sz="3500" dirty="0" smtClean="0">
+              <a:rPr lang="en-US" sz="3500" dirty="0">
                 <a:solidFill>
                   <a:srgbClr val="FFA300"/>
                 </a:solidFill>
-                <a:latin typeface="Arial"/>
                 <a:ea typeface="MS Gothic"/>
               </a:rPr>
-              <a:t>Standard settings</a:t>
-            </a:r>
-            <a:endParaRPr dirty="0"/>
+              <a:t>Index replication strategies</a:t>
+            </a:r>
+            <a:endParaRPr lang="en-US" sz="3600" dirty="0"/>
           </a:p>
         </p:txBody>
       </p:sp>
@@ -7761,29 +7760,25 @@
           <a:bodyPr lIns="0" tIns="0" rIns="41760" bIns="0" anchor="b"/>
           <a:lstStyle/>
           <a:p>
-            <a:pPr>
-              <a:lnSpc>
-                <a:spcPct val="100000"/>
-              </a:lnSpc>
-            </a:pPr>
-            <a:r>
-              <a:rPr lang="en-US" sz="3200" b="1" i="1" dirty="0">
+            <a:r>
+              <a:rPr lang="en-US" sz="3500" dirty="0">
                 <a:solidFill>
-                  <a:srgbClr val="4C4C4C"/>
+                  <a:srgbClr val="FFA300"/>
                 </a:solidFill>
                 <a:ea typeface="MS Gothic"/>
               </a:rPr>
               <a:t>Index replication </a:t>
             </a:r>
             <a:r>
-              <a:rPr lang="en-US" sz="3200" b="1" i="1" dirty="0" smtClean="0">
+              <a:rPr lang="en-US" sz="3500" dirty="0" smtClean="0">
                 <a:solidFill>
-                  <a:srgbClr val="4C4C4C"/>
+                  <a:srgbClr val="FFA300"/>
                 </a:solidFill>
                 <a:ea typeface="MS Gothic"/>
               </a:rPr>
               <a:t>strategies</a:t>
             </a:r>
+            <a:endParaRPr lang="en-US" sz="3500" dirty="0"/>
           </a:p>
         </p:txBody>
       </p:sp>
@@ -7947,22 +7942,25 @@
           <a:bodyPr lIns="0" tIns="0" rIns="41760" bIns="0" anchor="b"/>
           <a:lstStyle/>
           <a:p>
-            <a:pPr>
-              <a:lnSpc>
-                <a:spcPct val="100000"/>
-              </a:lnSpc>
-            </a:pPr>
-            <a:r>
-              <a:rPr lang="en-GB" sz="3500" dirty="0" smtClean="0">
+            <a:r>
+              <a:rPr lang="en-US" sz="3500" dirty="0">
                 <a:solidFill>
                   <a:srgbClr val="FFA300"/>
                 </a:solidFill>
-                <a:latin typeface="Arial"/>
                 <a:ea typeface="MS Gothic"/>
               </a:rPr>
-              <a:t>Standard settings</a:t>
-            </a:r>
-            <a:endParaRPr dirty="0"/>
+              <a:t>Index replication </a:t>
+            </a:r>
+            <a:r>
+              <a:rPr lang="en-US" sz="3500" dirty="0" smtClean="0">
+                <a:solidFill>
+                  <a:srgbClr val="FFA300"/>
+                </a:solidFill>
+                <a:ea typeface="MS Gothic"/>
+              </a:rPr>
+              <a:t>strategies</a:t>
+            </a:r>
+            <a:endParaRPr lang="en-US" sz="3500" dirty="0"/>
           </a:p>
         </p:txBody>
       </p:sp>
@@ -8197,29 +8195,25 @@
           <a:bodyPr lIns="0" tIns="0" rIns="41760" bIns="0" anchor="b"/>
           <a:lstStyle/>
           <a:p>
-            <a:pPr>
-              <a:lnSpc>
-                <a:spcPct val="100000"/>
-              </a:lnSpc>
-            </a:pPr>
-            <a:r>
-              <a:rPr lang="en-US" sz="3200" b="1" i="1" dirty="0">
+            <a:r>
+              <a:rPr lang="en-US" sz="3500" dirty="0">
                 <a:solidFill>
-                  <a:srgbClr val="4C4C4C"/>
+                  <a:srgbClr val="FFA300"/>
                 </a:solidFill>
                 <a:ea typeface="MS Gothic"/>
               </a:rPr>
               <a:t>Index replication </a:t>
             </a:r>
             <a:r>
-              <a:rPr lang="en-US" sz="3200" b="1" i="1" dirty="0" smtClean="0">
+              <a:rPr lang="en-US" sz="3500" dirty="0" smtClean="0">
                 <a:solidFill>
-                  <a:srgbClr val="4C4C4C"/>
+                  <a:srgbClr val="FFA300"/>
                 </a:solidFill>
                 <a:ea typeface="MS Gothic"/>
               </a:rPr>
               <a:t>strategies</a:t>
             </a:r>
+            <a:endParaRPr lang="en-US" sz="3500" dirty="0"/>
           </a:p>
         </p:txBody>
       </p:sp>
@@ -8389,14 +8383,13 @@
               </a:lnSpc>
             </a:pPr>
             <a:r>
-              <a:rPr lang="en-GB" sz="3500" dirty="0" smtClean="0">
+              <a:rPr lang="en-US" sz="3500" dirty="0">
                 <a:solidFill>
                   <a:srgbClr val="FFA300"/>
                 </a:solidFill>
-                <a:latin typeface="Arial"/>
                 <a:ea typeface="MS Gothic"/>
               </a:rPr>
-              <a:t>Standard settings</a:t>
+              <a:t>Index replication strategies</a:t>
             </a:r>
             <a:endParaRPr dirty="0"/>
           </a:p>
@@ -8857,15 +8850,7 @@
             </a:pPr>
             <a:r>
               <a:rPr lang="en-US" sz="2200" b="1" i="1" dirty="0" smtClean="0"/>
-              <a:t>The value storage if enabled </a:t>
-            </a:r>
-            <a:r>
-              <a:rPr lang="en-US" sz="2200" b="1" i="1" dirty="0" smtClean="0"/>
-              <a:t>is stored into </a:t>
-            </a:r>
-            <a:r>
-              <a:rPr lang="en-US" sz="2200" b="1" i="1" dirty="0" smtClean="0"/>
-              <a:t>a shared File System</a:t>
+              <a:t>The value storage if enabled is stored into a shared File System</a:t>
             </a:r>
           </a:p>
           <a:p>
@@ -9302,13 +9287,8 @@
             </a:r>
             <a:r>
               <a:rPr lang="fr-FR" sz="2000" b="1" i="1" dirty="0" smtClean="0"/>
-              <a:t> </a:t>
-            </a:r>
-            <a:r>
-              <a:rPr lang="fr-FR" sz="2000" b="1" i="1" dirty="0" smtClean="0"/>
-              <a:t>mode</a:t>
-            </a:r>
-            <a:endParaRPr lang="fr-FR" sz="2000" b="1" i="1" dirty="0" smtClean="0"/>
+              <a:t> mode</a:t>
+            </a:r>
           </a:p>
           <a:p>
             <a:pPr marL="342900" indent="-342900">
@@ -9891,15 +9871,7 @@
             </a:r>
             <a:r>
               <a:rPr lang="it-IT" sz="2000" dirty="0" smtClean="0"/>
-              <a:t> by </a:t>
-            </a:r>
-            <a:r>
-              <a:rPr lang="it-IT" sz="2000" dirty="0" smtClean="0"/>
-              <a:t>the </a:t>
-            </a:r>
-            <a:r>
-              <a:rPr lang="it-IT" sz="2000" dirty="0" smtClean="0"/>
-              <a:t>JCR cache</a:t>
+              <a:t> by the JCR cache</a:t>
             </a:r>
             <a:endParaRPr lang="it-IT" sz="2000" dirty="0"/>
           </a:p>
@@ -10010,11 +9982,7 @@
             </a:r>
             <a:r>
               <a:rPr lang="de-DE" sz="2000" dirty="0" smtClean="0"/>
-              <a:t> </a:t>
-            </a:r>
-            <a:r>
-              <a:rPr lang="de-DE" sz="2000" dirty="0" smtClean="0"/>
-              <a:t>JCR </a:t>
+              <a:t> JCR </a:t>
             </a:r>
             <a:r>
               <a:rPr lang="de-DE" sz="2000" dirty="0" err="1" smtClean="0"/>
@@ -10919,15 +10887,7 @@
             </a:r>
             <a:r>
               <a:rPr lang="it-IT" sz="2000" dirty="0" smtClean="0"/>
-              <a:t> by </a:t>
-            </a:r>
-            <a:r>
-              <a:rPr lang="it-IT" sz="2000" dirty="0" smtClean="0"/>
-              <a:t>the </a:t>
-            </a:r>
-            <a:r>
-              <a:rPr lang="it-IT" sz="2000" dirty="0" smtClean="0"/>
-              <a:t>Lock Manager</a:t>
+              <a:t> by the Lock Manager</a:t>
             </a:r>
             <a:endParaRPr lang="it-IT" sz="2000" dirty="0"/>
           </a:p>
@@ -11038,13 +10998,8 @@
             </a:r>
             <a:r>
               <a:rPr lang="de-DE" sz="2000" dirty="0" smtClean="0"/>
-              <a:t> </a:t>
-            </a:r>
-            <a:r>
-              <a:rPr lang="de-DE" sz="2000" dirty="0" smtClean="0"/>
-              <a:t>Lock Manager</a:t>
-            </a:r>
-            <a:endParaRPr lang="de-DE" sz="2000" dirty="0" smtClean="0"/>
+              <a:t> Lock Manager</a:t>
+            </a:r>
           </a:p>
           <a:p>
             <a:pPr marL="342900" indent="-342900">
@@ -11875,11 +11830,7 @@
             </a:r>
             <a:r>
               <a:rPr lang="it-IT" sz="2000" b="1" i="1" dirty="0" smtClean="0"/>
-              <a:t> </a:t>
-            </a:r>
-            <a:r>
-              <a:rPr lang="it-IT" sz="2000" b="1" i="1" dirty="0" smtClean="0"/>
-              <a:t>set to </a:t>
+              <a:t> set to </a:t>
             </a:r>
             <a:r>
               <a:rPr lang="en-US" sz="2000" b="1" i="1" dirty="0" err="1" smtClean="0"/>
@@ -13575,15 +13526,7 @@
             </a:r>
             <a:r>
               <a:rPr lang="en-US" dirty="0" smtClean="0"/>
-              <a:t>path to the JBC configuration </a:t>
-            </a:r>
-            <a:r>
-              <a:rPr lang="en-US" dirty="0" smtClean="0"/>
-              <a:t>used by </a:t>
-            </a:r>
-            <a:r>
-              <a:rPr lang="en-US" dirty="0" smtClean="0"/>
-              <a:t>the indexer</a:t>
+              <a:t>path to the JBC configuration used by the indexer</a:t>
             </a:r>
           </a:p>
           <a:p>
@@ -13629,15 +13572,7 @@
             </a:r>
             <a:r>
               <a:rPr lang="en-US" dirty="0" smtClean="0"/>
-              <a:t>name of the cluster </a:t>
-            </a:r>
-            <a:r>
-              <a:rPr lang="en-US" dirty="0" smtClean="0"/>
-              <a:t>used </a:t>
-            </a:r>
-            <a:r>
-              <a:rPr lang="en-US" dirty="0" smtClean="0"/>
-              <a:t>for the indexer</a:t>
+              <a:t>name of the cluster used for the indexer</a:t>
             </a:r>
           </a:p>
           <a:p>
@@ -15083,7 +15018,7 @@
               </a:lnSpc>
             </a:pPr>
             <a:r>
-              <a:rPr lang="en-GB" sz="3500">
+              <a:rPr lang="en-GB" sz="3500" dirty="0">
                 <a:solidFill>
                   <a:srgbClr val="FFA300"/>
                 </a:solidFill>
@@ -15092,7 +15027,7 @@
               </a:rPr>
               <a:t>Table of Contents</a:t>
             </a:r>
-            <a:endParaRPr/>
+            <a:endParaRPr dirty="0"/>
           </a:p>
         </p:txBody>
       </p:sp>
@@ -21059,29 +20994,25 @@
           <a:bodyPr lIns="0" tIns="0" rIns="41760" bIns="0" anchor="b"/>
           <a:lstStyle/>
           <a:p>
-            <a:pPr>
-              <a:lnSpc>
-                <a:spcPct val="100000"/>
-              </a:lnSpc>
-            </a:pPr>
-            <a:r>
-              <a:rPr lang="en-US" sz="3200" b="1" i="1" dirty="0">
+            <a:r>
+              <a:rPr lang="en-US" sz="3500" dirty="0">
                 <a:solidFill>
-                  <a:srgbClr val="4C4C4C"/>
+                  <a:srgbClr val="FFA300"/>
                 </a:solidFill>
                 <a:ea typeface="MS Gothic"/>
               </a:rPr>
               <a:t>Index replication </a:t>
             </a:r>
             <a:r>
-              <a:rPr lang="en-US" sz="3200" b="1" i="1" dirty="0" smtClean="0">
+              <a:rPr lang="en-US" sz="3500" dirty="0" smtClean="0">
                 <a:solidFill>
-                  <a:srgbClr val="4C4C4C"/>
+                  <a:srgbClr val="FFA300"/>
                 </a:solidFill>
                 <a:ea typeface="MS Gothic"/>
               </a:rPr>
               <a:t>strategies</a:t>
             </a:r>
+            <a:endParaRPr lang="en-US" sz="3500" dirty="0"/>
           </a:p>
         </p:txBody>
       </p:sp>

</xml_diff>